<commit_message>
update: cleanup for software corruption causes
Signed-off-by: Yong Yang <yangoliver@gmail.com>
</commit_message>
<xml_diff>
--- a/slides/2016/kmem_slab_corruption_debug.pptx
+++ b/slides/2016/kmem_slab_corruption_debug.pptx
@@ -167,7 +167,7 @@
   </p:defaultTextStyle>
   <p:extLst>
     <p:ext uri="{EFAFB233-063F-42B5-8137-9DF3F51BA10A}">
-      <p15:sldGuideLst xmlns:p15="http://schemas.microsoft.com/office/powerpoint/2012/main">
+      <p15:sldGuideLst xmlns:p15="http://schemas.microsoft.com/office/powerpoint/2012/main" xmlns="">
         <p15:guide id="1" orient="horz" pos="2160">
           <p15:clr>
             <a:srgbClr val="A4A3A4"/>
@@ -292,7 +292,7 @@
             <a:fld id="{768B765A-B4C8-4081-A28D-7EFAD458A63E}" type="datetime1">
               <a:rPr lang="en-US"/>
               <a:pPr/>
-              <a:t>7/30/16</a:t>
+              <a:t>17/8/22</a:t>
             </a:fld>
             <a:endParaRPr lang="en-US"/>
           </a:p>
@@ -712,7 +712,7 @@
             <a:fld id="{768B765A-B4C8-4081-A28D-7EFAD458A63E}" type="datetime1">
               <a:rPr lang="en-US" smtClean="0"/>
               <a:pPr/>
-              <a:t>7/30/16</a:t>
+              <a:t>17/8/22</a:t>
             </a:fld>
             <a:endParaRPr lang="en-US"/>
           </a:p>
@@ -831,7 +831,7 @@
             <a:fld id="{768B765A-B4C8-4081-A28D-7EFAD458A63E}" type="datetime1">
               <a:rPr lang="en-US" smtClean="0"/>
               <a:pPr/>
-              <a:t>7/30/16</a:t>
+              <a:t>17/8/22</a:t>
             </a:fld>
             <a:endParaRPr lang="en-US"/>
           </a:p>
@@ -950,7 +950,7 @@
             <a:fld id="{768B765A-B4C8-4081-A28D-7EFAD458A63E}" type="datetime1">
               <a:rPr lang="en-US" smtClean="0"/>
               <a:pPr/>
-              <a:t>7/30/16</a:t>
+              <a:t>17/8/22</a:t>
             </a:fld>
             <a:endParaRPr lang="en-US"/>
           </a:p>
@@ -1069,7 +1069,7 @@
             <a:fld id="{768B765A-B4C8-4081-A28D-7EFAD458A63E}" type="datetime1">
               <a:rPr lang="en-US" smtClean="0"/>
               <a:pPr/>
-              <a:t>7/30/16</a:t>
+              <a:t>17/8/22</a:t>
             </a:fld>
             <a:endParaRPr lang="en-US"/>
           </a:p>
@@ -1188,7 +1188,7 @@
             <a:fld id="{768B765A-B4C8-4081-A28D-7EFAD458A63E}" type="datetime1">
               <a:rPr lang="en-US" smtClean="0"/>
               <a:pPr/>
-              <a:t>7/30/16</a:t>
+              <a:t>17/8/22</a:t>
             </a:fld>
             <a:endParaRPr lang="en-US"/>
           </a:p>
@@ -1307,7 +1307,7 @@
             <a:fld id="{768B765A-B4C8-4081-A28D-7EFAD458A63E}" type="datetime1">
               <a:rPr lang="en-US" smtClean="0"/>
               <a:pPr/>
-              <a:t>7/30/16</a:t>
+              <a:t>17/8/22</a:t>
             </a:fld>
             <a:endParaRPr lang="en-US"/>
           </a:p>
@@ -1426,7 +1426,7 @@
             <a:fld id="{768B765A-B4C8-4081-A28D-7EFAD458A63E}" type="datetime1">
               <a:rPr lang="en-US" smtClean="0"/>
               <a:pPr/>
-              <a:t>7/30/16</a:t>
+              <a:t>17/8/22</a:t>
             </a:fld>
             <a:endParaRPr lang="en-US"/>
           </a:p>
@@ -1545,7 +1545,7 @@
             <a:fld id="{768B765A-B4C8-4081-A28D-7EFAD458A63E}" type="datetime1">
               <a:rPr lang="en-US" smtClean="0"/>
               <a:pPr/>
-              <a:t>7/30/16</a:t>
+              <a:t>17/8/22</a:t>
             </a:fld>
             <a:endParaRPr lang="en-US"/>
           </a:p>
@@ -1664,7 +1664,7 @@
             <a:fld id="{768B765A-B4C8-4081-A28D-7EFAD458A63E}" type="datetime1">
               <a:rPr lang="en-US" smtClean="0"/>
               <a:pPr/>
-              <a:t>7/30/16</a:t>
+              <a:t>17/8/22</a:t>
             </a:fld>
             <a:endParaRPr lang="en-US"/>
           </a:p>
@@ -2213,7 +2213,7 @@
             <a:fld id="{28E80666-FB37-4B36-9149-507F3B0178E3}" type="datetimeFigureOut">
               <a:rPr lang="en-US" smtClean="0"/>
               <a:pPr/>
-              <a:t>7/30/16</a:t>
+              <a:t>17/8/22</a:t>
             </a:fld>
             <a:endParaRPr lang="en-US"/>
           </a:p>
@@ -2281,13 +2281,13 @@
   <p:clrMapOvr>
     <a:masterClrMapping/>
   </p:clrMapOvr>
-  <p:transition>
+  <p:transition xmlns:p14="http://schemas.microsoft.com/office/powerpoint/2010/main">
     <p:fade/>
   </p:transition>
   <p:timing>
     <p:tnLst>
       <p:par>
-        <p:cTn id="1" dur="indefinite" restart="never" nodeType="tmRoot"/>
+        <p:cTn xmlns:p14="http://schemas.microsoft.com/office/powerpoint/2010/main" id="1" dur="indefinite" restart="never" nodeType="tmRoot"/>
       </p:par>
     </p:tnLst>
   </p:timing>
@@ -2403,7 +2403,7 @@
           <a:p>
             <a:fld id="{EB56BFD0-4E6C-2E4B-958D-6E580A6FCA2B}" type="datetimeFigureOut">
               <a:rPr lang="en-US" smtClean="0"/>
-              <a:t>7/30/16</a:t>
+              <a:t>17/8/22</a:t>
             </a:fld>
             <a:endParaRPr lang="en-US"/>
           </a:p>
@@ -2461,13 +2461,13 @@
   <p:clrMapOvr>
     <a:masterClrMapping/>
   </p:clrMapOvr>
-  <p:transition>
+  <p:transition xmlns:p14="http://schemas.microsoft.com/office/powerpoint/2010/main">
     <p:fade/>
   </p:transition>
   <p:timing>
     <p:tnLst>
       <p:par>
-        <p:cTn id="1" dur="indefinite" restart="never" nodeType="tmRoot"/>
+        <p:cTn xmlns:p14="http://schemas.microsoft.com/office/powerpoint/2010/main" id="1" dur="indefinite" restart="never" nodeType="tmRoot"/>
       </p:par>
     </p:tnLst>
   </p:timing>
@@ -2593,7 +2593,7 @@
           <a:p>
             <a:fld id="{EB56BFD0-4E6C-2E4B-958D-6E580A6FCA2B}" type="datetimeFigureOut">
               <a:rPr lang="en-US" smtClean="0"/>
-              <a:t>7/30/16</a:t>
+              <a:t>17/8/22</a:t>
             </a:fld>
             <a:endParaRPr lang="en-US"/>
           </a:p>
@@ -2651,13 +2651,13 @@
   <p:clrMapOvr>
     <a:masterClrMapping/>
   </p:clrMapOvr>
-  <p:transition>
+  <p:transition xmlns:p14="http://schemas.microsoft.com/office/powerpoint/2010/main">
     <p:fade/>
   </p:transition>
   <p:timing>
     <p:tnLst>
       <p:par>
-        <p:cTn id="1" dur="indefinite" restart="never" nodeType="tmRoot"/>
+        <p:cTn xmlns:p14="http://schemas.microsoft.com/office/powerpoint/2010/main" id="1" dur="indefinite" restart="never" nodeType="tmRoot"/>
       </p:par>
     </p:tnLst>
   </p:timing>
@@ -2773,7 +2773,7 @@
           <a:p>
             <a:fld id="{EB56BFD0-4E6C-2E4B-958D-6E580A6FCA2B}" type="datetimeFigureOut">
               <a:rPr lang="en-US" smtClean="0"/>
-              <a:t>7/30/16</a:t>
+              <a:t>17/8/22</a:t>
             </a:fld>
             <a:endParaRPr lang="en-US"/>
           </a:p>
@@ -2831,13 +2831,13 @@
   <p:clrMapOvr>
     <a:masterClrMapping/>
   </p:clrMapOvr>
-  <p:transition>
+  <p:transition xmlns:p14="http://schemas.microsoft.com/office/powerpoint/2010/main">
     <p:fade/>
   </p:transition>
   <p:timing>
     <p:tnLst>
       <p:par>
-        <p:cTn id="1" dur="indefinite" restart="never" nodeType="tmRoot"/>
+        <p:cTn xmlns:p14="http://schemas.microsoft.com/office/powerpoint/2010/main" id="1" dur="indefinite" restart="never" nodeType="tmRoot"/>
       </p:par>
     </p:tnLst>
   </p:timing>
@@ -3107,7 +3107,7 @@
             <a:fld id="{28E80666-FB37-4B36-9149-507F3B0178E3}" type="datetimeFigureOut">
               <a:rPr lang="en-US" smtClean="0"/>
               <a:pPr/>
-              <a:t>7/30/16</a:t>
+              <a:t>17/8/22</a:t>
             </a:fld>
             <a:endParaRPr lang="en-US"/>
           </a:p>
@@ -3340,13 +3340,13 @@
   <p:clrMapOvr>
     <a:masterClrMapping/>
   </p:clrMapOvr>
-  <p:transition>
+  <p:transition xmlns:p14="http://schemas.microsoft.com/office/powerpoint/2010/main">
     <p:fade/>
   </p:transition>
   <p:timing>
     <p:tnLst>
       <p:par>
-        <p:cTn id="1" dur="indefinite" restart="never" nodeType="tmRoot"/>
+        <p:cTn xmlns:p14="http://schemas.microsoft.com/office/powerpoint/2010/main" id="1" dur="indefinite" restart="never" nodeType="tmRoot"/>
       </p:par>
     </p:tnLst>
   </p:timing>
@@ -3580,7 +3580,7 @@
           <a:p>
             <a:fld id="{EB56BFD0-4E6C-2E4B-958D-6E580A6FCA2B}" type="datetimeFigureOut">
               <a:rPr lang="en-US" smtClean="0"/>
-              <a:t>7/30/16</a:t>
+              <a:t>17/8/22</a:t>
             </a:fld>
             <a:endParaRPr lang="en-US"/>
           </a:p>
@@ -3638,13 +3638,13 @@
   <p:clrMapOvr>
     <a:masterClrMapping/>
   </p:clrMapOvr>
-  <p:transition>
+  <p:transition xmlns:p14="http://schemas.microsoft.com/office/powerpoint/2010/main">
     <p:fade/>
   </p:transition>
   <p:timing>
     <p:tnLst>
       <p:par>
-        <p:cTn id="1" dur="indefinite" restart="never" nodeType="tmRoot"/>
+        <p:cTn xmlns:p14="http://schemas.microsoft.com/office/powerpoint/2010/main" id="1" dur="indefinite" restart="never" nodeType="tmRoot"/>
       </p:par>
     </p:tnLst>
   </p:timing>
@@ -4001,7 +4001,7 @@
           <a:p>
             <a:fld id="{EB56BFD0-4E6C-2E4B-958D-6E580A6FCA2B}" type="datetimeFigureOut">
               <a:rPr lang="en-US" smtClean="0"/>
-              <a:t>7/30/16</a:t>
+              <a:t>17/8/22</a:t>
             </a:fld>
             <a:endParaRPr lang="en-US"/>
           </a:p>
@@ -4082,13 +4082,13 @@
   <p:clrMapOvr>
     <a:masterClrMapping/>
   </p:clrMapOvr>
-  <p:transition>
+  <p:transition xmlns:p14="http://schemas.microsoft.com/office/powerpoint/2010/main">
     <p:fade/>
   </p:transition>
   <p:timing>
     <p:tnLst>
       <p:par>
-        <p:cTn id="1" dur="indefinite" restart="never" nodeType="tmRoot"/>
+        <p:cTn xmlns:p14="http://schemas.microsoft.com/office/powerpoint/2010/main" id="1" dur="indefinite" restart="never" nodeType="tmRoot"/>
       </p:par>
     </p:tnLst>
   </p:timing>
@@ -4129,7 +4129,7 @@
           <a:p>
             <a:fld id="{EB56BFD0-4E6C-2E4B-958D-6E580A6FCA2B}" type="datetimeFigureOut">
               <a:rPr lang="en-US" smtClean="0"/>
-              <a:t>7/30/16</a:t>
+              <a:t>17/8/22</a:t>
             </a:fld>
             <a:endParaRPr lang="en-US"/>
           </a:p>
@@ -4210,13 +4210,13 @@
   <p:clrMapOvr>
     <a:masterClrMapping/>
   </p:clrMapOvr>
-  <p:transition>
+  <p:transition xmlns:p14="http://schemas.microsoft.com/office/powerpoint/2010/main">
     <p:fade/>
   </p:transition>
   <p:timing>
     <p:tnLst>
       <p:par>
-        <p:cTn id="1" dur="indefinite" restart="never" nodeType="tmRoot"/>
+        <p:cTn xmlns:p14="http://schemas.microsoft.com/office/powerpoint/2010/main" id="1" dur="indefinite" restart="never" nodeType="tmRoot"/>
       </p:par>
     </p:tnLst>
   </p:timing>
@@ -4257,7 +4257,7 @@
           <a:p>
             <a:fld id="{EB56BFD0-4E6C-2E4B-958D-6E580A6FCA2B}" type="datetimeFigureOut">
               <a:rPr lang="en-US" smtClean="0"/>
-              <a:t>7/30/16</a:t>
+              <a:t>17/8/22</a:t>
             </a:fld>
             <a:endParaRPr lang="en-US"/>
           </a:p>
@@ -4315,13 +4315,13 @@
   <p:clrMapOvr>
     <a:masterClrMapping/>
   </p:clrMapOvr>
-  <p:transition>
+  <p:transition xmlns:p14="http://schemas.microsoft.com/office/powerpoint/2010/main">
     <p:fade/>
   </p:transition>
   <p:timing>
     <p:tnLst>
       <p:par>
-        <p:cTn id="1" dur="indefinite" restart="never" nodeType="tmRoot"/>
+        <p:cTn xmlns:p14="http://schemas.microsoft.com/office/powerpoint/2010/main" id="1" dur="indefinite" restart="never" nodeType="tmRoot"/>
       </p:par>
     </p:tnLst>
   </p:timing>
@@ -4625,7 +4625,7 @@
           <a:p>
             <a:fld id="{EB56BFD0-4E6C-2E4B-958D-6E580A6FCA2B}" type="datetimeFigureOut">
               <a:rPr lang="en-US" smtClean="0"/>
-              <a:t>7/30/16</a:t>
+              <a:t>17/8/22</a:t>
             </a:fld>
             <a:endParaRPr lang="en-US"/>
           </a:p>
@@ -4849,13 +4849,13 @@
   <p:clrMapOvr>
     <a:masterClrMapping/>
   </p:clrMapOvr>
-  <p:transition>
+  <p:transition xmlns:p14="http://schemas.microsoft.com/office/powerpoint/2010/main">
     <p:fade/>
   </p:transition>
   <p:timing>
     <p:tnLst>
       <p:par>
-        <p:cTn id="1" dur="indefinite" restart="never" nodeType="tmRoot"/>
+        <p:cTn xmlns:p14="http://schemas.microsoft.com/office/powerpoint/2010/main" id="1" dur="indefinite" restart="never" nodeType="tmRoot"/>
       </p:par>
     </p:tnLst>
   </p:timing>
@@ -5155,7 +5155,7 @@
           <a:p>
             <a:fld id="{EB56BFD0-4E6C-2E4B-958D-6E580A6FCA2B}" type="datetimeFigureOut">
               <a:rPr lang="en-US" smtClean="0"/>
-              <a:t>7/30/16</a:t>
+              <a:t>17/8/22</a:t>
             </a:fld>
             <a:endParaRPr lang="en-US"/>
           </a:p>
@@ -5359,13 +5359,13 @@
   <p:clrMapOvr>
     <a:masterClrMapping/>
   </p:clrMapOvr>
-  <p:transition>
+  <p:transition xmlns:p14="http://schemas.microsoft.com/office/powerpoint/2010/main">
     <p:fade/>
   </p:transition>
   <p:timing>
     <p:tnLst>
       <p:par>
-        <p:cTn id="1" dur="indefinite" restart="never" nodeType="tmRoot"/>
+        <p:cTn xmlns:p14="http://schemas.microsoft.com/office/powerpoint/2010/main" id="1" dur="indefinite" restart="never" nodeType="tmRoot"/>
       </p:par>
     </p:tnLst>
   </p:timing>
@@ -5689,7 +5689,7 @@
           <a:p>
             <a:fld id="{EB56BFD0-4E6C-2E4B-958D-6E580A6FCA2B}" type="datetimeFigureOut">
               <a:rPr lang="en-US" smtClean="0"/>
-              <a:t>7/30/16</a:t>
+              <a:t>17/8/22</a:t>
             </a:fld>
             <a:endParaRPr lang="en-US"/>
           </a:p>
@@ -5793,13 +5793,13 @@
     <p:sldLayoutId id="2147484648" r:id="rId10"/>
     <p:sldLayoutId id="2147484649" r:id="rId11"/>
   </p:sldLayoutIdLst>
-  <p:transition>
+  <p:transition xmlns:p14="http://schemas.microsoft.com/office/powerpoint/2010/main">
     <p:fade/>
   </p:transition>
   <p:timing>
     <p:tnLst>
       <p:par>
-        <p:cTn id="1" dur="indefinite" restart="never" nodeType="tmRoot"/>
+        <p:cTn xmlns:p14="http://schemas.microsoft.com/office/powerpoint/2010/main" id="1" dur="indefinite" restart="never" nodeType="tmRoot"/>
       </p:par>
     </p:tnLst>
   </p:timing>
@@ -6202,11 +6202,7 @@
             <a:pPr algn="r"/>
             <a:r>
               <a:rPr lang="en-US" sz="3600" dirty="0" smtClean="0"/>
-              <a:t>Kernel Memory Corruption </a:t>
-            </a:r>
-            <a:r>
-              <a:rPr lang="en-US" sz="3600" dirty="0" smtClean="0"/>
-              <a:t>Debug</a:t>
+              <a:t>Kernel Memory Corruption Debug</a:t>
             </a:r>
             <a:br>
               <a:rPr lang="en-US" sz="3600" dirty="0" smtClean="0"/>
@@ -6297,17 +6293,7 @@
                 <a:latin typeface="Calibri" pitchFamily="34" charset="0"/>
                 <a:sym typeface="Calibri" pitchFamily="34" charset="0"/>
               </a:rPr>
-              <a:t>Jan 15</a:t>
-            </a:r>
-            <a:r>
-              <a:rPr lang="en-US" dirty="0" smtClean="0">
-                <a:solidFill>
-                  <a:srgbClr val="5F5F5F"/>
-                </a:solidFill>
-                <a:latin typeface="Calibri" pitchFamily="34" charset="0"/>
-                <a:sym typeface="Calibri" pitchFamily="34" charset="0"/>
-              </a:rPr>
-              <a:t>, 2014</a:t>
+              <a:t>Jan 15, 2014</a:t>
             </a:r>
           </a:p>
           <a:p>
@@ -6367,13 +6353,13 @@
   <p:clrMapOvr>
     <a:masterClrMapping/>
   </p:clrMapOvr>
-  <p:transition>
+  <p:transition xmlns:p14="http://schemas.microsoft.com/office/powerpoint/2010/main">
     <p:fade/>
   </p:transition>
   <p:timing>
     <p:tnLst>
       <p:par>
-        <p:cTn id="1" dur="indefinite" restart="never" nodeType="tmRoot"/>
+        <p:cTn xmlns:p14="http://schemas.microsoft.com/office/powerpoint/2010/main" id="1" dur="indefinite" restart="never" nodeType="tmRoot"/>
       </p:par>
     </p:tnLst>
   </p:timing>
@@ -31951,13 +31937,13 @@
   <p:clrMapOvr>
     <a:masterClrMapping/>
   </p:clrMapOvr>
-  <p:transition>
+  <p:transition xmlns:p14="http://schemas.microsoft.com/office/powerpoint/2010/main">
     <p:fade/>
   </p:transition>
   <p:timing>
     <p:tnLst>
       <p:par>
-        <p:cTn id="1" dur="indefinite" restart="never" nodeType="tmRoot"/>
+        <p:cTn xmlns:p14="http://schemas.microsoft.com/office/powerpoint/2010/main" id="1" dur="indefinite" restart="never" nodeType="tmRoot"/>
       </p:par>
     </p:tnLst>
   </p:timing>
@@ -32164,13 +32150,13 @@
   <p:clrMapOvr>
     <a:masterClrMapping/>
   </p:clrMapOvr>
-  <p:transition>
+  <p:transition xmlns:p14="http://schemas.microsoft.com/office/powerpoint/2010/main">
     <p:fade/>
   </p:transition>
   <p:timing>
     <p:tnLst>
       <p:par>
-        <p:cTn id="1" dur="indefinite" restart="never" nodeType="tmRoot"/>
+        <p:cTn xmlns:p14="http://schemas.microsoft.com/office/powerpoint/2010/main" id="1" dur="indefinite" restart="never" nodeType="tmRoot"/>
       </p:par>
     </p:tnLst>
   </p:timing>
@@ -32376,13 +32362,13 @@
   <p:clrMapOvr>
     <a:masterClrMapping/>
   </p:clrMapOvr>
-  <p:transition>
+  <p:transition xmlns:p14="http://schemas.microsoft.com/office/powerpoint/2010/main">
     <p:fade/>
   </p:transition>
   <p:timing>
     <p:tnLst>
       <p:par>
-        <p:cTn id="1" dur="indefinite" restart="never" nodeType="tmRoot"/>
+        <p:cTn xmlns:p14="http://schemas.microsoft.com/office/powerpoint/2010/main" id="1" dur="indefinite" restart="never" nodeType="tmRoot"/>
       </p:par>
     </p:tnLst>
   </p:timing>
@@ -32793,13 +32779,13 @@
   <p:clrMapOvr>
     <a:masterClrMapping/>
   </p:clrMapOvr>
-  <p:transition>
+  <p:transition xmlns:p14="http://schemas.microsoft.com/office/powerpoint/2010/main">
     <p:fade/>
   </p:transition>
   <p:timing>
     <p:tnLst>
       <p:par>
-        <p:cTn id="1" dur="indefinite" restart="never" nodeType="tmRoot"/>
+        <p:cTn xmlns:p14="http://schemas.microsoft.com/office/powerpoint/2010/main" id="1" dur="indefinite" restart="never" nodeType="tmRoot"/>
       </p:par>
     </p:tnLst>
   </p:timing>
@@ -32864,7 +32850,7 @@
         </p:spPr>
         <p:txBody>
           <a:bodyPr>
-            <a:normAutofit fontScale="92500"/>
+            <a:normAutofit/>
           </a:bodyPr>
           <a:lstStyle/>
           <a:p>
@@ -33424,13 +33410,13 @@
   <p:clrMapOvr>
     <a:masterClrMapping/>
   </p:clrMapOvr>
-  <p:transition>
+  <p:transition xmlns:p14="http://schemas.microsoft.com/office/powerpoint/2010/main">
     <p:fade/>
   </p:transition>
   <p:timing>
     <p:tnLst>
       <p:par>
-        <p:cTn id="1" dur="indefinite" restart="never" nodeType="tmRoot"/>
+        <p:cTn xmlns:p14="http://schemas.microsoft.com/office/powerpoint/2010/main" id="1" dur="indefinite" restart="never" nodeType="tmRoot"/>
       </p:par>
     </p:tnLst>
   </p:timing>
@@ -34114,13 +34100,13 @@
   <p:clrMapOvr>
     <a:masterClrMapping/>
   </p:clrMapOvr>
-  <p:transition>
+  <p:transition xmlns:p14="http://schemas.microsoft.com/office/powerpoint/2010/main">
     <p:fade/>
   </p:transition>
   <p:timing>
     <p:tnLst>
       <p:par>
-        <p:cTn id="1" dur="indefinite" restart="never" nodeType="tmRoot"/>
+        <p:cTn xmlns:p14="http://schemas.microsoft.com/office/powerpoint/2010/main" id="1" dur="indefinite" restart="never" nodeType="tmRoot"/>
       </p:par>
     </p:tnLst>
   </p:timing>
@@ -34236,13 +34222,13 @@
   <p:clrMapOvr>
     <a:masterClrMapping/>
   </p:clrMapOvr>
-  <p:transition>
+  <p:transition xmlns:p14="http://schemas.microsoft.com/office/powerpoint/2010/main">
     <p:fade/>
   </p:transition>
   <p:timing>
     <p:tnLst>
       <p:par>
-        <p:cTn id="1" dur="indefinite" restart="never" nodeType="tmRoot"/>
+        <p:cTn xmlns:p14="http://schemas.microsoft.com/office/powerpoint/2010/main" id="1" dur="indefinite" restart="never" nodeType="tmRoot"/>
       </p:par>
     </p:tnLst>
   </p:timing>
@@ -34341,13 +34327,13 @@
   <p:clrMapOvr>
     <a:masterClrMapping/>
   </p:clrMapOvr>
-  <p:transition>
+  <p:transition xmlns:p14="http://schemas.microsoft.com/office/powerpoint/2010/main">
     <p:fade/>
   </p:transition>
   <p:timing>
     <p:tnLst>
       <p:par>
-        <p:cTn id="1" dur="indefinite" restart="never" nodeType="tmRoot"/>
+        <p:cTn xmlns:p14="http://schemas.microsoft.com/office/powerpoint/2010/main" id="1" dur="indefinite" restart="never" nodeType="tmRoot"/>
       </p:par>
     </p:tnLst>
   </p:timing>
@@ -34394,15 +34380,7 @@
             </a:r>
             <a:r>
               <a:rPr lang="en-US" dirty="0" smtClean="0"/>
-              <a:t>ernel </a:t>
-            </a:r>
-            <a:r>
-              <a:rPr lang="en-US" dirty="0" smtClean="0"/>
-              <a:t>C</a:t>
-            </a:r>
-            <a:r>
-              <a:rPr lang="en-US" dirty="0" smtClean="0"/>
-              <a:t>ore Analysis</a:t>
+              <a:t>ernel Core Analysis</a:t>
             </a:r>
             <a:endParaRPr lang="en-US" dirty="0"/>
           </a:p>
@@ -34443,21 +34421,8 @@
           <a:p>
             <a:r>
               <a:rPr lang="en-US" dirty="0" smtClean="0"/>
-              <a:t>N</a:t>
+              <a:t>Nail down issue by code</a:t>
             </a:r>
-            <a:r>
-              <a:rPr lang="en-US" dirty="0" smtClean="0"/>
-              <a:t>ail </a:t>
-            </a:r>
-            <a:r>
-              <a:rPr lang="en-US" dirty="0" smtClean="0"/>
-              <a:t>down </a:t>
-            </a:r>
-            <a:r>
-              <a:rPr lang="en-US" dirty="0" smtClean="0"/>
-              <a:t>issue by code</a:t>
-            </a:r>
-            <a:endParaRPr lang="en-US" dirty="0" smtClean="0"/>
           </a:p>
         </p:txBody>
       </p:sp>
@@ -34466,13 +34431,13 @@
   <p:clrMapOvr>
     <a:masterClrMapping/>
   </p:clrMapOvr>
-  <p:transition>
+  <p:transition xmlns:p14="http://schemas.microsoft.com/office/powerpoint/2010/main">
     <p:fade/>
   </p:transition>
   <p:timing>
     <p:tnLst>
       <p:par>
-        <p:cTn id="1" dur="indefinite" restart="never" nodeType="tmRoot"/>
+        <p:cTn xmlns:p14="http://schemas.microsoft.com/office/powerpoint/2010/main" id="1" dur="indefinite" restart="never" nodeType="tmRoot"/>
       </p:par>
     </p:tnLst>
   </p:timing>
@@ -34515,15 +34480,7 @@
           <a:p>
             <a:r>
               <a:rPr lang="en-US" dirty="0" smtClean="0"/>
-              <a:t>Identify </a:t>
-            </a:r>
-            <a:r>
-              <a:rPr lang="en-US" dirty="0" smtClean="0"/>
-              <a:t>corruption </a:t>
-            </a:r>
-            <a:r>
-              <a:rPr lang="en-US" dirty="0" smtClean="0"/>
-              <a:t>location</a:t>
+              <a:t>Identify corruption location</a:t>
             </a:r>
           </a:p>
         </p:txBody>
@@ -34550,11 +34507,7 @@
           <a:p>
             <a:r>
               <a:rPr lang="en-US" dirty="0" smtClean="0"/>
-              <a:t>Understand </a:t>
-            </a:r>
-            <a:r>
-              <a:rPr lang="en-US" dirty="0" smtClean="0"/>
-              <a:t>the scenario</a:t>
+              <a:t>Understand the scenario</a:t>
             </a:r>
           </a:p>
           <a:p>
@@ -34576,13 +34529,13 @@
   <p:clrMapOvr>
     <a:masterClrMapping/>
   </p:clrMapOvr>
-  <p:transition>
+  <p:transition xmlns:p14="http://schemas.microsoft.com/office/powerpoint/2010/main">
     <p:fade/>
   </p:transition>
   <p:timing>
     <p:tnLst>
       <p:par>
-        <p:cTn id="1" dur="indefinite" restart="never" nodeType="tmRoot"/>
+        <p:cTn xmlns:p14="http://schemas.microsoft.com/office/powerpoint/2010/main" id="1" dur="indefinite" restart="never" nodeType="tmRoot"/>
       </p:par>
     </p:tnLst>
   </p:timing>
@@ -34677,13 +34630,13 @@
   <p:clrMapOvr>
     <a:masterClrMapping/>
   </p:clrMapOvr>
-  <p:transition>
+  <p:transition xmlns:p14="http://schemas.microsoft.com/office/powerpoint/2010/main">
     <p:fade/>
   </p:transition>
   <p:timing>
     <p:tnLst>
       <p:par>
-        <p:cTn id="1" dur="indefinite" restart="never" nodeType="tmRoot"/>
+        <p:cTn xmlns:p14="http://schemas.microsoft.com/office/powerpoint/2010/main" id="1" dur="indefinite" restart="never" nodeType="tmRoot"/>
       </p:par>
     </p:tnLst>
   </p:timing>
@@ -34763,11 +34716,7 @@
           <a:p>
             <a:r>
               <a:rPr lang="en-US" dirty="0" smtClean="0"/>
-              <a:t>Get </a:t>
-            </a:r>
-            <a:r>
-              <a:rPr lang="en-US" dirty="0" smtClean="0"/>
-              <a:t>to familiar with the corrupted data structure</a:t>
+              <a:t>Get to familiar with the corrupted data structure</a:t>
             </a:r>
           </a:p>
           <a:p>
@@ -34855,13 +34804,13 @@
   <p:clrMapOvr>
     <a:masterClrMapping/>
   </p:clrMapOvr>
-  <p:transition>
+  <p:transition xmlns:p14="http://schemas.microsoft.com/office/powerpoint/2010/main">
     <p:fade/>
   </p:transition>
   <p:timing>
     <p:tnLst>
       <p:par>
-        <p:cTn id="1" dur="indefinite" restart="never" nodeType="tmRoot"/>
+        <p:cTn xmlns:p14="http://schemas.microsoft.com/office/powerpoint/2010/main" id="1" dur="indefinite" restart="never" nodeType="tmRoot"/>
       </p:par>
     </p:tnLst>
   </p:timing>
@@ -34928,11 +34877,7 @@
           <a:p>
             <a:r>
               <a:rPr lang="en-US" dirty="0" smtClean="0"/>
-              <a:t>Search </a:t>
-            </a:r>
-            <a:r>
-              <a:rPr lang="en-US" dirty="0" smtClean="0"/>
-              <a:t>the pointer if culprit owns the pointer</a:t>
+              <a:t>Search the pointer if culprit owns the pointer</a:t>
             </a:r>
           </a:p>
           <a:p>
@@ -34998,13 +34943,13 @@
   <p:clrMapOvr>
     <a:masterClrMapping/>
   </p:clrMapOvr>
-  <p:transition>
+  <p:transition xmlns:p14="http://schemas.microsoft.com/office/powerpoint/2010/main">
     <p:fade/>
   </p:transition>
   <p:timing>
     <p:tnLst>
       <p:par>
-        <p:cTn id="1" dur="indefinite" restart="never" nodeType="tmRoot"/>
+        <p:cTn xmlns:p14="http://schemas.microsoft.com/office/powerpoint/2010/main" id="1" dur="indefinite" restart="never" nodeType="tmRoot"/>
       </p:par>
     </p:tnLst>
   </p:timing>
@@ -35069,11 +35014,7 @@
           <a:p>
             <a:r>
               <a:rPr lang="en-US" dirty="0" smtClean="0"/>
-              <a:t>Narrow </a:t>
-            </a:r>
-            <a:r>
-              <a:rPr lang="en-US" dirty="0" smtClean="0"/>
-              <a:t>down the source code in possible culprit</a:t>
+              <a:t>Narrow down the source code in possible culprit</a:t>
             </a:r>
           </a:p>
           <a:p>
@@ -35121,13 +35062,13 @@
   <p:clrMapOvr>
     <a:masterClrMapping/>
   </p:clrMapOvr>
-  <p:transition>
+  <p:transition xmlns:p14="http://schemas.microsoft.com/office/powerpoint/2010/main">
     <p:fade/>
   </p:transition>
   <p:timing>
     <p:tnLst>
       <p:par>
-        <p:cTn id="1" dur="indefinite" restart="never" nodeType="tmRoot"/>
+        <p:cTn xmlns:p14="http://schemas.microsoft.com/office/powerpoint/2010/main" id="1" dur="indefinite" restart="never" nodeType="tmRoot"/>
       </p:par>
     </p:tnLst>
   </p:timing>
@@ -35226,13 +35167,13 @@
   <p:clrMapOvr>
     <a:masterClrMapping/>
   </p:clrMapOvr>
-  <p:transition>
+  <p:transition xmlns:p14="http://schemas.microsoft.com/office/powerpoint/2010/main">
     <p:fade/>
   </p:transition>
   <p:timing>
     <p:tnLst>
       <p:par>
-        <p:cTn id="1" dur="indefinite" restart="never" nodeType="tmRoot"/>
+        <p:cTn xmlns:p14="http://schemas.microsoft.com/office/powerpoint/2010/main" id="1" dur="indefinite" restart="never" nodeType="tmRoot"/>
       </p:par>
     </p:tnLst>
   </p:timing>
@@ -35277,11 +35218,7 @@
             </a:r>
             <a:r>
               <a:rPr lang="en-US" dirty="0" smtClean="0"/>
-              <a:t> Slab corruption bug - </a:t>
-            </a:r>
-            <a:r>
-              <a:rPr lang="en-US" dirty="0" smtClean="0"/>
-              <a:t>1</a:t>
+              <a:t> Slab corruption bug - 1</a:t>
             </a:r>
             <a:endParaRPr lang="en-US" dirty="0"/>
           </a:p>
@@ -35427,13 +35364,13 @@
   <p:clrMapOvr>
     <a:masterClrMapping/>
   </p:clrMapOvr>
-  <p:transition>
+  <p:transition xmlns:p14="http://schemas.microsoft.com/office/powerpoint/2010/main">
     <p:fade/>
   </p:transition>
   <p:timing>
     <p:tnLst>
       <p:par>
-        <p:cTn id="1" dur="indefinite" restart="never" nodeType="tmRoot"/>
+        <p:cTn xmlns:p14="http://schemas.microsoft.com/office/powerpoint/2010/main" id="1" dur="indefinite" restart="never" nodeType="tmRoot"/>
       </p:par>
     </p:tnLst>
   </p:timing>
@@ -35480,7 +35417,6 @@
               <a:rPr lang="en-US" dirty="0"/>
               <a:t>2</a:t>
             </a:r>
-            <a:endParaRPr lang="en-US" dirty="0"/>
           </a:p>
         </p:txBody>
       </p:sp>
@@ -35562,13 +35498,13 @@
   <p:clrMapOvr>
     <a:masterClrMapping/>
   </p:clrMapOvr>
-  <p:transition>
+  <p:transition xmlns:p14="http://schemas.microsoft.com/office/powerpoint/2010/main">
     <p:fade/>
   </p:transition>
   <p:timing>
     <p:tnLst>
       <p:par>
-        <p:cTn id="1" dur="indefinite" restart="never" nodeType="tmRoot"/>
+        <p:cTn xmlns:p14="http://schemas.microsoft.com/office/powerpoint/2010/main" id="1" dur="indefinite" restart="never" nodeType="tmRoot"/>
       </p:par>
     </p:tnLst>
   </p:timing>
@@ -35615,7 +35551,6 @@
               <a:rPr lang="en-US" dirty="0"/>
               <a:t>3</a:t>
             </a:r>
-            <a:endParaRPr lang="en-US" dirty="0"/>
           </a:p>
         </p:txBody>
       </p:sp>
@@ -35722,13 +35657,13 @@
   <p:clrMapOvr>
     <a:masterClrMapping/>
   </p:clrMapOvr>
-  <p:transition>
+  <p:transition xmlns:p14="http://schemas.microsoft.com/office/powerpoint/2010/main">
     <p:fade/>
   </p:transition>
   <p:timing>
     <p:tnLst>
       <p:par>
-        <p:cTn id="1" dur="indefinite" restart="never" nodeType="tmRoot"/>
+        <p:cTn xmlns:p14="http://schemas.microsoft.com/office/powerpoint/2010/main" id="1" dur="indefinite" restart="never" nodeType="tmRoot"/>
       </p:par>
     </p:tnLst>
   </p:timing>
@@ -35827,13 +35762,13 @@
   <p:clrMapOvr>
     <a:masterClrMapping/>
   </p:clrMapOvr>
-  <p:transition>
+  <p:transition xmlns:p14="http://schemas.microsoft.com/office/powerpoint/2010/main">
     <p:fade/>
   </p:transition>
   <p:timing>
     <p:tnLst>
       <p:par>
-        <p:cTn id="1" dur="indefinite" restart="never" nodeType="tmRoot"/>
+        <p:cTn xmlns:p14="http://schemas.microsoft.com/office/powerpoint/2010/main" id="1" dur="indefinite" restart="never" nodeType="tmRoot"/>
       </p:par>
     </p:tnLst>
   </p:timing>
@@ -35876,7 +35811,11 @@
           <a:p>
             <a:r>
               <a:rPr lang="en-US" dirty="0" smtClean="0"/>
-              <a:t>Improvements for memory corruption</a:t>
+              <a:t>Improvements for memory </a:t>
+            </a:r>
+            <a:r>
+              <a:rPr lang="en-US" dirty="0" smtClean="0"/>
+              <a:t>corruption debug</a:t>
             </a:r>
             <a:endParaRPr lang="en-US" dirty="0"/>
           </a:p>
@@ -35920,13 +35859,8 @@
             <a:pPr lvl="1"/>
             <a:r>
               <a:rPr lang="en-US" dirty="0" smtClean="0"/>
-              <a:t>R</a:t>
+              <a:t>Release testing</a:t>
             </a:r>
-            <a:r>
-              <a:rPr lang="en-US" dirty="0" smtClean="0"/>
-              <a:t>elease testing</a:t>
-            </a:r>
-            <a:endParaRPr lang="en-US" dirty="0" smtClean="0"/>
           </a:p>
           <a:p>
             <a:r>
@@ -35935,11 +35869,15 @@
             </a:r>
             <a:r>
               <a:rPr lang="en-US" dirty="0" err="1" smtClean="0"/>
-              <a:t>debuggability</a:t>
+              <a:t>debugability</a:t>
             </a:r>
             <a:r>
               <a:rPr lang="en-US" dirty="0" smtClean="0"/>
-              <a:t> for kernel/driver</a:t>
+              <a:t> </a:t>
+            </a:r>
+            <a:r>
+              <a:rPr lang="en-US" dirty="0" smtClean="0"/>
+              <a:t>for kernel/driver</a:t>
             </a:r>
           </a:p>
           <a:p>
@@ -35953,33 +35891,21 @@
             <a:pPr lvl="1"/>
             <a:r>
               <a:rPr lang="en-US" dirty="0" smtClean="0"/>
-              <a:t>Consider </a:t>
-            </a:r>
-            <a:r>
-              <a:rPr lang="en-US" dirty="0" smtClean="0"/>
-              <a:t>to implement some debug features</a:t>
+              <a:t>Consider to implement some debug features</a:t>
             </a:r>
           </a:p>
           <a:p>
             <a:pPr lvl="2"/>
             <a:r>
               <a:rPr lang="en-US" dirty="0" smtClean="0"/>
-              <a:t>Create module/driver </a:t>
-            </a:r>
-            <a:r>
-              <a:rPr lang="en-US" dirty="0" smtClean="0"/>
-              <a:t>unique memory signature</a:t>
+              <a:t>Create module/driver unique memory signature</a:t>
             </a:r>
           </a:p>
           <a:p>
             <a:pPr lvl="2"/>
             <a:r>
               <a:rPr lang="en-US" dirty="0" smtClean="0"/>
-              <a:t>Introduce </a:t>
-            </a:r>
-            <a:r>
-              <a:rPr lang="en-US" dirty="0" smtClean="0"/>
-              <a:t>the </a:t>
+              <a:t>Introduce the </a:t>
             </a:r>
             <a:r>
               <a:rPr lang="en-US" dirty="0" err="1" smtClean="0"/>
@@ -35995,12 +35921,19 @@
             </a:r>
             <a:r>
               <a:rPr lang="en-US" dirty="0" smtClean="0"/>
-              <a:t> code </a:t>
+              <a:t> code in module/</a:t>
             </a:r>
             <a:r>
               <a:rPr lang="en-US" dirty="0" smtClean="0"/>
-              <a:t>in module/driver</a:t>
+              <a:t>driver</a:t>
             </a:r>
+          </a:p>
+          <a:p>
+            <a:r>
+              <a:rPr lang="en-US" dirty="0" smtClean="0"/>
+              <a:t>Use kernel debug features</a:t>
+            </a:r>
+            <a:endParaRPr lang="en-US" dirty="0" smtClean="0"/>
           </a:p>
           <a:p>
             <a:pPr lvl="1"/>
@@ -36018,29 +35951,38 @@
             </a:r>
             <a:r>
               <a:rPr lang="en-US" dirty="0" smtClean="0"/>
-              <a:t>which has more debug features</a:t>
+              <a:t>which </a:t>
             </a:r>
-          </a:p>
-          <a:p>
-            <a:pPr lvl="2"/>
             <a:r>
               <a:rPr lang="en-US" dirty="0" smtClean="0"/>
-              <a:t>Production mode debug features</a:t>
+              <a:t>enables SLUG_DEBUG</a:t>
             </a:r>
           </a:p>
           <a:p>
-            <a:pPr lvl="2"/>
+            <a:pPr lvl="1"/>
             <a:r>
               <a:rPr lang="en-US" dirty="0" smtClean="0"/>
-              <a:t>Per </a:t>
+              <a:t>Debug page </a:t>
             </a:r>
             <a:r>
               <a:rPr lang="en-US" dirty="0" err="1" smtClean="0"/>
-              <a:t>kmem</a:t>
+              <a:t>alloc</a:t>
             </a:r>
+            <a:endParaRPr lang="en-US" dirty="0" smtClean="0"/>
+          </a:p>
+          <a:p>
+            <a:pPr lvl="1"/>
+            <a:r>
+              <a:rPr lang="en-US" dirty="0" err="1" smtClean="0"/>
+              <a:t>Kmemcheck</a:t>
+            </a:r>
+            <a:endParaRPr lang="en-US" dirty="0" smtClean="0"/>
+          </a:p>
+          <a:p>
+            <a:pPr lvl="1"/>
             <a:r>
               <a:rPr lang="en-US" dirty="0" smtClean="0"/>
-              <a:t> cache granularity</a:t>
+              <a:t>KASAN</a:t>
             </a:r>
             <a:endParaRPr lang="en-US" dirty="0" smtClean="0"/>
           </a:p>
@@ -36051,13 +35993,13 @@
   <p:clrMapOvr>
     <a:masterClrMapping/>
   </p:clrMapOvr>
-  <p:transition>
+  <p:transition xmlns:p14="http://schemas.microsoft.com/office/powerpoint/2010/main">
     <p:fade/>
   </p:transition>
   <p:timing>
     <p:tnLst>
       <p:par>
-        <p:cTn id="1" dur="indefinite" restart="never" nodeType="tmRoot"/>
+        <p:cTn xmlns:p14="http://schemas.microsoft.com/office/powerpoint/2010/main" id="1" dur="indefinite" restart="never" nodeType="tmRoot"/>
       </p:par>
     </p:tnLst>
   </p:timing>
@@ -36243,13 +36185,13 @@
   <p:clrMapOvr>
     <a:masterClrMapping/>
   </p:clrMapOvr>
-  <p:transition>
+  <p:transition xmlns:p14="http://schemas.microsoft.com/office/powerpoint/2010/main">
     <p:fade/>
   </p:transition>
   <p:timing>
     <p:tnLst>
       <p:par>
-        <p:cTn id="1" dur="indefinite" restart="never" nodeType="tmRoot"/>
+        <p:cTn xmlns:p14="http://schemas.microsoft.com/office/powerpoint/2010/main" id="1" dur="indefinite" restart="never" nodeType="tmRoot"/>
       </p:par>
     </p:tnLst>
   </p:timing>
@@ -36348,13 +36290,13 @@
   <p:clrMapOvr>
     <a:masterClrMapping/>
   </p:clrMapOvr>
-  <p:transition>
+  <p:transition xmlns:p14="http://schemas.microsoft.com/office/powerpoint/2010/main">
     <p:fade/>
   </p:transition>
   <p:timing>
     <p:tnLst>
       <p:par>
-        <p:cTn id="1" dur="indefinite" restart="never" nodeType="tmRoot"/>
+        <p:cTn xmlns:p14="http://schemas.microsoft.com/office/powerpoint/2010/main" id="1" dur="indefinite" restart="never" nodeType="tmRoot"/>
       </p:par>
     </p:tnLst>
   </p:timing>
@@ -36488,13 +36430,13 @@
   <p:clrMapOvr>
     <a:masterClrMapping/>
   </p:clrMapOvr>
-  <p:transition>
+  <p:transition xmlns:p14="http://schemas.microsoft.com/office/powerpoint/2010/main">
     <p:fade/>
   </p:transition>
   <p:timing>
     <p:tnLst>
       <p:par>
-        <p:cTn id="1" dur="indefinite" restart="never" nodeType="tmRoot"/>
+        <p:cTn xmlns:p14="http://schemas.microsoft.com/office/powerpoint/2010/main" id="1" dur="indefinite" restart="never" nodeType="tmRoot"/>
       </p:par>
     </p:tnLst>
   </p:timing>
@@ -36567,64 +36509,110 @@
             <a:pPr lvl="1"/>
             <a:r>
               <a:rPr lang="en-US" dirty="0" smtClean="0"/>
-              <a:t>Using uninitialized memory</a:t>
+              <a:t>Use before </a:t>
+            </a:r>
+            <a:r>
+              <a:rPr lang="en-US" dirty="0" err="1" smtClean="0"/>
+              <a:t>initilaization</a:t>
+            </a:r>
+            <a:endParaRPr lang="en-US" dirty="0" smtClean="0"/>
+          </a:p>
+          <a:p>
+            <a:pPr lvl="1"/>
+            <a:r>
+              <a:rPr lang="en-US" dirty="0" smtClean="0"/>
+              <a:t>Use </a:t>
+            </a:r>
+            <a:r>
+              <a:rPr lang="en-US" dirty="0" smtClean="0"/>
+              <a:t>after </a:t>
+            </a:r>
+            <a:r>
+              <a:rPr lang="en-US" dirty="0" smtClean="0"/>
+              <a:t>free on heap, stack, global</a:t>
+            </a:r>
+          </a:p>
+          <a:p>
+            <a:pPr lvl="2"/>
+            <a:r>
+              <a:rPr lang="en-US" altLang="zh-CN" dirty="0" smtClean="0"/>
+              <a:t>Reference invalid memory</a:t>
+            </a:r>
+            <a:endParaRPr lang="en-US" altLang="zh-CN" dirty="0" smtClean="0"/>
+          </a:p>
+          <a:p>
+            <a:pPr lvl="2"/>
+            <a:r>
+              <a:rPr lang="en-US" altLang="zh-CN" dirty="0" smtClean="0"/>
+              <a:t>Double free</a:t>
+            </a:r>
+            <a:endParaRPr lang="en-US" dirty="0" smtClean="0"/>
+          </a:p>
+          <a:p>
+            <a:pPr lvl="1"/>
+            <a:r>
+              <a:rPr lang="en-US" altLang="zh-CN" dirty="0" smtClean="0"/>
+              <a:t>Out of bound memory access</a:t>
+            </a:r>
+            <a:endParaRPr lang="en-US" dirty="0" smtClean="0"/>
+          </a:p>
+          <a:p>
+            <a:pPr lvl="2"/>
+            <a:r>
+              <a:rPr lang="en-US" altLang="zh-CN" dirty="0" smtClean="0"/>
+              <a:t>Heap</a:t>
+            </a:r>
+            <a:r>
+              <a:rPr lang="en-US" dirty="0" smtClean="0"/>
+              <a:t> </a:t>
+            </a:r>
+            <a:r>
+              <a:rPr lang="en-US" dirty="0" smtClean="0"/>
+              <a:t>overflow</a:t>
             </a:r>
           </a:p>
           <a:p>
             <a:pPr lvl="2"/>
             <a:r>
               <a:rPr lang="en-US" dirty="0" smtClean="0"/>
-              <a:t>Wild pointer</a:t>
+              <a:t>Stack </a:t>
             </a:r>
+            <a:r>
+              <a:rPr lang="en-US" dirty="0" smtClean="0"/>
+              <a:t>overflow</a:t>
+            </a:r>
+          </a:p>
+          <a:p>
+            <a:pPr lvl="2"/>
+            <a:r>
+              <a:rPr lang="en-US" altLang="zh-CN" dirty="0" smtClean="0"/>
+              <a:t>Global overflow</a:t>
+            </a:r>
+            <a:endParaRPr lang="en-US" dirty="0" smtClean="0"/>
+          </a:p>
+          <a:p>
+            <a:pPr lvl="1"/>
+            <a:r>
+              <a:rPr lang="en-US" altLang="zh-CN" dirty="0" smtClean="0"/>
+              <a:t>Data race</a:t>
+            </a:r>
+            <a:endParaRPr lang="en-US" dirty="0" smtClean="0"/>
           </a:p>
           <a:p>
             <a:pPr lvl="2"/>
             <a:r>
               <a:rPr lang="en-US" dirty="0" smtClean="0"/>
-              <a:t>Use after free</a:t>
+              <a:t>Race </a:t>
             </a:r>
-          </a:p>
-          <a:p>
-            <a:pPr lvl="1"/>
             <a:r>
               <a:rPr lang="en-US" dirty="0" smtClean="0"/>
-              <a:t>Using un-owned or beyond allocated memory</a:t>
+              <a:t>conditions on memory </a:t>
             </a:r>
-          </a:p>
-          <a:p>
-            <a:pPr lvl="2"/>
             <a:r>
               <a:rPr lang="en-US" dirty="0" smtClean="0"/>
-              <a:t>Buffer overflow</a:t>
+              <a:t>modifications</a:t>
             </a:r>
-          </a:p>
-          <a:p>
-            <a:pPr lvl="2"/>
-            <a:r>
-              <a:rPr lang="en-US" dirty="0" smtClean="0"/>
-              <a:t>Stack overflow</a:t>
-            </a:r>
-          </a:p>
-          <a:p>
-            <a:pPr lvl="2"/>
-            <a:r>
-              <a:rPr lang="en-US" dirty="0" smtClean="0"/>
-              <a:t>Race conditions on memory modifications</a:t>
-            </a:r>
-          </a:p>
-          <a:p>
-            <a:pPr lvl="1"/>
-            <a:r>
-              <a:rPr lang="en-US" dirty="0" smtClean="0"/>
-              <a:t>Faulty heap memory management</a:t>
-            </a:r>
-          </a:p>
-          <a:p>
-            <a:pPr lvl="2"/>
-            <a:r>
-              <a:rPr lang="en-US" dirty="0" smtClean="0"/>
-              <a:t>Double free</a:t>
-            </a:r>
+            <a:endParaRPr lang="en-US" dirty="0" smtClean="0"/>
           </a:p>
         </p:txBody>
       </p:sp>
@@ -36633,13 +36621,13 @@
   <p:clrMapOvr>
     <a:masterClrMapping/>
   </p:clrMapOvr>
-  <p:transition>
+  <p:transition xmlns:p14="http://schemas.microsoft.com/office/powerpoint/2010/main">
     <p:fade/>
   </p:transition>
   <p:timing>
     <p:tnLst>
       <p:par>
-        <p:cTn id="1" dur="indefinite" restart="never" nodeType="tmRoot"/>
+        <p:cTn xmlns:p14="http://schemas.microsoft.com/office/powerpoint/2010/main" id="1" dur="indefinite" restart="never" nodeType="tmRoot"/>
       </p:par>
     </p:tnLst>
   </p:timing>
@@ -36772,13 +36760,13 @@
   <p:clrMapOvr>
     <a:masterClrMapping/>
   </p:clrMapOvr>
-  <p:transition>
+  <p:transition xmlns:p14="http://schemas.microsoft.com/office/powerpoint/2010/main">
     <p:fade/>
   </p:transition>
   <p:timing>
     <p:tnLst>
       <p:par>
-        <p:cTn id="1" dur="indefinite" restart="never" nodeType="tmRoot"/>
+        <p:cTn xmlns:p14="http://schemas.microsoft.com/office/powerpoint/2010/main" id="1" dur="indefinite" restart="never" nodeType="tmRoot"/>
       </p:par>
     </p:tnLst>
   </p:timing>
@@ -37400,13 +37388,13 @@
   <p:clrMapOvr>
     <a:masterClrMapping/>
   </p:clrMapOvr>
-  <p:transition>
+  <p:transition xmlns:p14="http://schemas.microsoft.com/office/powerpoint/2010/main">
     <p:fade/>
   </p:transition>
   <p:timing>
     <p:tnLst>
       <p:par>
-        <p:cTn id="1" dur="indefinite" restart="never" nodeType="tmRoot"/>
+        <p:cTn xmlns:p14="http://schemas.microsoft.com/office/powerpoint/2010/main" id="1" dur="indefinite" restart="never" nodeType="tmRoot"/>
       </p:par>
     </p:tnLst>
   </p:timing>
@@ -37481,13 +37469,13 @@
   <p:clrMapOvr>
     <a:masterClrMapping/>
   </p:clrMapOvr>
-  <p:transition>
+  <p:transition xmlns:p14="http://schemas.microsoft.com/office/powerpoint/2010/main">
     <p:fade/>
   </p:transition>
   <p:timing>
     <p:tnLst>
       <p:par>
-        <p:cTn id="1" dur="indefinite" restart="never" nodeType="tmRoot"/>
+        <p:cTn xmlns:p14="http://schemas.microsoft.com/office/powerpoint/2010/main" id="1" dur="indefinite" restart="never" nodeType="tmRoot"/>
       </p:par>
     </p:tnLst>
   </p:timing>
@@ -38072,13 +38060,13 @@
   <p:clrMapOvr>
     <a:masterClrMapping/>
   </p:clrMapOvr>
-  <p:transition>
+  <p:transition xmlns:p14="http://schemas.microsoft.com/office/powerpoint/2010/main">
     <p:fade/>
   </p:transition>
   <p:timing>
     <p:tnLst>
       <p:par>
-        <p:cTn id="1" dur="indefinite" restart="never" nodeType="tmRoot"/>
+        <p:cTn xmlns:p14="http://schemas.microsoft.com/office/powerpoint/2010/main" id="1" dur="indefinite" restart="never" nodeType="tmRoot"/>
       </p:par>
     </p:tnLst>
   </p:timing>
@@ -38128,7 +38116,7 @@
     </a:clrScheme>
     <a:fontScheme name="Wood Type">
       <a:majorFont>
-        <a:latin typeface="Century Gothic" panose="020B0502020202020204"/>
+        <a:latin typeface="Century Gothic"/>
         <a:ea typeface=""/>
         <a:cs typeface=""/>
         <a:font script="Jpan" typeface="HGｺﾞｼｯｸM"/>
@@ -38162,7 +38150,7 @@
         <a:font script="Uigh" typeface="Microsoft Uighur"/>
       </a:majorFont>
       <a:minorFont>
-        <a:latin typeface="Bookman Old Style" panose="02050604050505020204"/>
+        <a:latin typeface="Bookman Old Style"/>
         <a:ea typeface=""/>
         <a:cs typeface=""/>
         <a:font script="Grek" typeface="Cambria"/>
@@ -38306,7 +38294,7 @@
   <a:extraClrSchemeLst/>
   <a:extLst>
     <a:ext uri="{05A4C25C-085E-4340-85A3-A5531E510DB2}">
-      <thm15:themeFamily xmlns:thm15="http://schemas.microsoft.com/office/thememl/2012/main" name="Wood Type" id="{7ACABC62-BF99-48CF-A9DC-4DB89C7B13DC}" vid="{8E89CD47-BF55-4DDE-B823-2283AA7E7695}"/>
+      <thm15:themeFamily xmlns:thm15="http://schemas.microsoft.com/office/thememl/2012/main" xmlns="" name="Wood Type" id="{7ACABC62-BF99-48CF-A9DC-4DB89C7B13DC}" vid="{8E89CD47-BF55-4DDE-B823-2283AA7E7695}"/>
     </a:ext>
   </a:extLst>
 </a:theme>

</xml_diff>